<commit_message>
Updated gyro codes in file
</commit_message>
<xml_diff>
--- a/translations/en-us/advanced/GyroRevisited.pptx
+++ b/translations/en-us/advanced/GyroRevisited.pptx
@@ -226,7 +226,7 @@
           <a:p>
             <a:fld id="{E354B44E-40A3-0E46-B16A-9BF1250A248B}" type="datetimeFigureOut">
               <a:rPr lang="en-US" smtClean="0"/>
-              <a:t>8/9/17</a:t>
+              <a:t>8/10/17</a:t>
             </a:fld>
             <a:endParaRPr lang="en-US"/>
           </a:p>
@@ -392,7 +392,7 @@
           <a:p>
             <a:fld id="{C86AD16C-2DB4-6642-BAD4-9ED973A087A0}" type="datetimeFigureOut">
               <a:rPr lang="en-US" smtClean="0"/>
-              <a:t>8/9/17</a:t>
+              <a:t>8/10/17</a:t>
             </a:fld>
             <a:endParaRPr lang="en-US"/>
           </a:p>
@@ -1535,7 +1535,7 @@
           <a:p>
             <a:fld id="{C8F7E75A-348F-5F43-B97B-561F6F131561}" type="datetime1">
               <a:rPr lang="en-US" smtClean="0"/>
-              <a:t>8/9/17</a:t>
+              <a:t>8/10/17</a:t>
             </a:fld>
             <a:endParaRPr lang="en-US"/>
           </a:p>
@@ -2240,7 +2240,7 @@
           <a:p>
             <a:fld id="{33BB9629-0735-4A4F-AB14-F6FCF07D0794}" type="datetime1">
               <a:rPr lang="en-US" smtClean="0"/>
-              <a:t>8/9/17</a:t>
+              <a:t>8/10/17</a:t>
             </a:fld>
             <a:endParaRPr lang="en-US"/>
           </a:p>
@@ -2703,7 +2703,7 @@
           <a:p>
             <a:fld id="{D4C1B692-332C-034C-9372-C77E668D8764}" type="datetime1">
               <a:rPr lang="en-US" smtClean="0"/>
-              <a:t>8/9/17</a:t>
+              <a:t>8/10/17</a:t>
             </a:fld>
             <a:endParaRPr lang="en-US" dirty="0"/>
           </a:p>
@@ -3168,7 +3168,7 @@
           <a:p>
             <a:fld id="{3DEB4BBC-D744-574F-B567-EE7240119039}" type="datetime1">
               <a:rPr lang="en-US" smtClean="0"/>
-              <a:t>8/9/17</a:t>
+              <a:t>8/10/17</a:t>
             </a:fld>
             <a:endParaRPr lang="en-US"/>
           </a:p>
@@ -3893,7 +3893,7 @@
           <a:p>
             <a:fld id="{A058D997-C3B6-3D4E-8570-66567B776A0B}" type="datetime1">
               <a:rPr lang="en-US" smtClean="0"/>
-              <a:t>8/9/17</a:t>
+              <a:t>8/10/17</a:t>
             </a:fld>
             <a:endParaRPr lang="en-US"/>
           </a:p>
@@ -4175,7 +4175,7 @@
           <a:p>
             <a:fld id="{3E426863-9FE8-3B40-BF31-AD871661BAA6}" type="datetime1">
               <a:rPr lang="en-US" smtClean="0"/>
-              <a:t>8/9/17</a:t>
+              <a:t>8/10/17</a:t>
             </a:fld>
             <a:endParaRPr lang="en-US"/>
           </a:p>
@@ -4495,7 +4495,7 @@
           <a:p>
             <a:fld id="{986DEA6D-5F23-EE47-8353-74CC0800E785}" type="datetime1">
               <a:rPr lang="en-US" smtClean="0"/>
-              <a:t>8/9/17</a:t>
+              <a:t>8/10/17</a:t>
             </a:fld>
             <a:endParaRPr lang="en-US"/>
           </a:p>
@@ -4724,7 +4724,7 @@
           <a:p>
             <a:fld id="{D814C63C-7003-DB4A-A896-EF275B2B7F73}" type="datetime1">
               <a:rPr lang="en-US" smtClean="0"/>
-              <a:t>8/9/17</a:t>
+              <a:t>8/10/17</a:t>
             </a:fld>
             <a:endParaRPr lang="en-US"/>
           </a:p>
@@ -5011,7 +5011,7 @@
           <a:p>
             <a:fld id="{22A25E22-54AB-F241-AD8F-DA467FFBDA7C}" type="datetime1">
               <a:rPr lang="en-US" smtClean="0"/>
-              <a:t>8/9/17</a:t>
+              <a:t>8/10/17</a:t>
             </a:fld>
             <a:endParaRPr lang="en-US" dirty="0"/>
           </a:p>
@@ -5255,7 +5255,7 @@
           <a:p>
             <a:fld id="{E5C57E15-E9B1-AF4B-8F6B-102F7A1C302A}" type="datetime1">
               <a:rPr lang="en-US" smtClean="0"/>
-              <a:t>8/9/17</a:t>
+              <a:t>8/10/17</a:t>
             </a:fld>
             <a:endParaRPr lang="en-US" dirty="0"/>
           </a:p>
@@ -6981,23 +6981,7 @@
           <a:p>
             <a:r>
               <a:rPr lang="en-US" dirty="0" smtClean="0"/>
-              <a:t>The new gyro calibration strategies in this lesson work for either the </a:t>
-            </a:r>
-            <a:r>
-              <a:rPr lang="en-US" dirty="0" smtClean="0"/>
-              <a:t>N2-N3 </a:t>
-            </a:r>
-            <a:r>
-              <a:rPr lang="en-US" dirty="0" smtClean="0"/>
-              <a:t>or </a:t>
-            </a:r>
-            <a:r>
-              <a:rPr lang="en-US" dirty="0" smtClean="0"/>
-              <a:t>N4-N6 </a:t>
-            </a:r>
-            <a:r>
-              <a:rPr lang="en-US" dirty="0" smtClean="0"/>
-              <a:t>sensors </a:t>
+              <a:t>The new gyro calibration strategies in this lesson work for either the N2-N3 or N4-N6 sensors </a:t>
             </a:r>
             <a:endParaRPr lang="en-US" dirty="0"/>
           </a:p>
@@ -7011,41 +6995,13 @@
             <a:pPr lvl="1"/>
             <a:r>
               <a:rPr lang="en-US" dirty="0" smtClean="0"/>
-              <a:t>Therefore, if you </a:t>
-            </a:r>
+              <a:t>Therefore, if you have older N2 and N3 gyros, you might want to use the old code that took less time to recalibrate.</a:t>
+            </a:r>
+          </a:p>
+          <a:p>
             <a:r>
               <a:rPr lang="en-US" dirty="0" smtClean="0"/>
-              <a:t>have </a:t>
-            </a:r>
-            <a:r>
-              <a:rPr lang="en-US" dirty="0" smtClean="0"/>
-              <a:t>older </a:t>
-            </a:r>
-            <a:r>
-              <a:rPr lang="en-US" dirty="0" smtClean="0"/>
-              <a:t>N2 and </a:t>
-            </a:r>
-            <a:r>
-              <a:rPr lang="en-US" dirty="0" smtClean="0"/>
-              <a:t>N3 gyros, </a:t>
-            </a:r>
-            <a:r>
-              <a:rPr lang="en-US" dirty="0" smtClean="0"/>
-              <a:t>you might want to use the old code that took less time to recalibrate.</a:t>
-            </a:r>
-          </a:p>
-          <a:p>
-            <a:r>
-              <a:rPr lang="en-US" dirty="0" smtClean="0"/>
-              <a:t>The newer </a:t>
-            </a:r>
-            <a:r>
-              <a:rPr lang="en-US" dirty="0" smtClean="0"/>
-              <a:t>N4-N6 </a:t>
-            </a:r>
-            <a:r>
-              <a:rPr lang="en-US" dirty="0" smtClean="0"/>
-              <a:t>sensors allow you to use different gyro modes inside a program without causing a recalibration.</a:t>
+              <a:t>The newer N4-N6 sensors allow you to use different gyro modes inside a program without causing a recalibration.</a:t>
             </a:r>
           </a:p>
           <a:p>
@@ -7059,23 +7015,7 @@
             </a:r>
             <a:r>
               <a:rPr lang="en-US" i="1" dirty="0" smtClean="0"/>
-              <a:t>There </a:t>
-            </a:r>
-            <a:r>
-              <a:rPr lang="en-US" i="1" dirty="0" smtClean="0"/>
-              <a:t>was a hardware change between the </a:t>
-            </a:r>
-            <a:r>
-              <a:rPr lang="en-US" i="1" dirty="0" smtClean="0"/>
-              <a:t>N3 </a:t>
-            </a:r>
-            <a:r>
-              <a:rPr lang="en-US" i="1" dirty="0" smtClean="0"/>
-              <a:t>and </a:t>
-            </a:r>
-            <a:r>
-              <a:rPr lang="en-US" i="1" dirty="0" smtClean="0"/>
-              <a:t>N4 gyro</a:t>
+              <a:t>There was a hardware change between the N3 and N4 gyro</a:t>
             </a:r>
             <a:r>
               <a:rPr lang="en-US" i="1" dirty="0"/>
@@ -7083,11 +7023,7 @@
             </a:r>
             <a:r>
               <a:rPr lang="en-US" i="1" dirty="0" smtClean="0"/>
-              <a:t>. </a:t>
-            </a:r>
-            <a:r>
-              <a:rPr lang="en-US" i="1" dirty="0" smtClean="0"/>
-              <a:t>The older gyros likely use </a:t>
+              <a:t>. The older gyros likely use </a:t>
             </a:r>
             <a:r>
               <a:rPr lang="hu-HU" dirty="0" smtClean="0"/>
@@ -7308,19 +7244,7 @@
           <a:p>
             <a:r>
               <a:rPr lang="en-US" sz="1600" dirty="0" smtClean="0"/>
-              <a:t>It </a:t>
-            </a:r>
-            <a:r>
-              <a:rPr lang="en-US" sz="1600" dirty="0" smtClean="0"/>
-              <a:t>appears that there is a date code </a:t>
-            </a:r>
-            <a:r>
-              <a:rPr lang="en-US" sz="1600" dirty="0" smtClean="0"/>
-              <a:t>on </a:t>
-            </a:r>
-            <a:r>
-              <a:rPr lang="en-US" sz="1600" dirty="0" smtClean="0"/>
-              <a:t>every gyro sensor. </a:t>
+              <a:t>It appears that there is a date code on every gyro sensor. </a:t>
             </a:r>
             <a:r>
               <a:rPr lang="en-US" sz="1600" dirty="0"/>
@@ -7357,11 +7281,7 @@
           <a:p>
             <a:r>
               <a:rPr lang="en-US" sz="1600" dirty="0" smtClean="0"/>
-              <a:t>By </a:t>
-            </a:r>
-            <a:r>
-              <a:rPr lang="en-US" sz="1600" dirty="0" smtClean="0"/>
-              <a:t>running EV3Dev, David </a:t>
+              <a:t>By running EV3Dev, David </a:t>
             </a:r>
             <a:r>
               <a:rPr lang="en-US" sz="1600" dirty="0" err="1" smtClean="0"/>
@@ -7369,27 +7289,7 @@
             </a:r>
             <a:r>
               <a:rPr lang="en-US" sz="1600" dirty="0" smtClean="0"/>
-              <a:t>, </a:t>
-            </a:r>
-            <a:r>
-              <a:rPr lang="en-US" sz="1600" dirty="0" smtClean="0"/>
-              <a:t>was able to identify that newer sensors have some additional secret modes (</a:t>
-            </a:r>
-            <a:r>
-              <a:rPr lang="en-US" sz="1600" dirty="0" smtClean="0"/>
-              <a:t>Tilt </a:t>
-            </a:r>
-            <a:r>
-              <a:rPr lang="en-US" sz="1600" dirty="0" smtClean="0"/>
-              <a:t>modes</a:t>
-            </a:r>
-            <a:r>
-              <a:rPr lang="en-US" sz="1600" dirty="0" smtClean="0"/>
-              <a:t>) enabled by the new hardware inside the sensor. </a:t>
-            </a:r>
-            <a:r>
-              <a:rPr lang="en-US" sz="1600" dirty="0" smtClean="0"/>
-              <a:t>These modes are </a:t>
+              <a:t>, was able to identify that newer sensors have some additional secret modes (Tilt modes) enabled by the new hardware inside the sensor. These modes are </a:t>
             </a:r>
             <a:r>
               <a:rPr lang="en-US" sz="1600" i="1" dirty="0" smtClean="0"/>
@@ -7397,11 +7297,7 @@
             </a:r>
             <a:r>
               <a:rPr lang="en-US" sz="1600" dirty="0" smtClean="0"/>
-              <a:t> through the standard EV3-G Gyro </a:t>
-            </a:r>
-            <a:r>
-              <a:rPr lang="en-US" sz="1600" dirty="0" smtClean="0"/>
-              <a:t>block even if you own the newer gyro sensors.</a:t>
+              <a:t> through the standard EV3-G Gyro block even if you own the newer gyro sensors.</a:t>
             </a:r>
           </a:p>
           <a:p>
@@ -7423,7 +7319,6 @@
               <a:rPr lang="en-US" sz="1600" dirty="0" smtClean="0"/>
               <a:t>.</a:t>
             </a:r>
-            <a:endParaRPr lang="en-US" sz="1600" dirty="0" smtClean="0"/>
           </a:p>
           <a:p>
             <a:r>
@@ -7432,11 +7327,7 @@
             </a:r>
             <a:r>
               <a:rPr lang="en-US" sz="1600" dirty="0" smtClean="0"/>
-              <a:t> believes that with </a:t>
-            </a:r>
-            <a:r>
-              <a:rPr lang="en-US" sz="1600" dirty="0" smtClean="0"/>
-              <a:t>N4, N5 and N6 sensors, since </a:t>
+              <a:t> believes that with N4, N5 and N6 sensors, since </a:t>
             </a:r>
             <a:r>
               <a:rPr lang="en-US" sz="1600" dirty="0"/>
@@ -7474,11 +7365,7 @@
             </a:r>
             <a:r>
               <a:rPr lang="en-US" sz="1600" dirty="0" smtClean="0"/>
-              <a:t>lock works in our solution code because </a:t>
-            </a:r>
-            <a:r>
-              <a:rPr lang="en-US" sz="1600" dirty="0" smtClean="0"/>
-              <a:t>it </a:t>
+              <a:t>lock works in our solution code because it </a:t>
             </a:r>
             <a:r>
               <a:rPr lang="en-US" sz="1600" dirty="0"/>
@@ -7486,11 +7373,7 @@
             </a:r>
             <a:r>
               <a:rPr lang="en-US" sz="1600" dirty="0" smtClean="0"/>
-              <a:t>causes </a:t>
-            </a:r>
-            <a:r>
-              <a:rPr lang="en-US" sz="1600" dirty="0" smtClean="0"/>
-              <a:t>the sensor to reset. This is because the LEGO firmware handles the IR sensor differently (</a:t>
+              <a:t>causes the sensor to reset. This is because the LEGO firmware handles the IR sensor differently (</a:t>
             </a:r>
             <a:r>
               <a:rPr lang="en-US" sz="1600" dirty="0"/>
@@ -7498,11 +7381,7 @@
             </a:r>
             <a:r>
               <a:rPr lang="en-US" sz="1600" dirty="0" smtClean="0"/>
-              <a:t>onger timeout)</a:t>
-            </a:r>
-            <a:r>
-              <a:rPr lang="en-US" sz="1600" dirty="0" smtClean="0"/>
-              <a:t>.</a:t>
+              <a:t>onger timeout).</a:t>
             </a:r>
             <a:endParaRPr lang="en-US" sz="1600" dirty="0"/>
           </a:p>
@@ -7587,11 +7466,7 @@
           <a:p>
             <a:r>
               <a:rPr lang="en-US" dirty="0" smtClean="0"/>
-              <a:t>What is </a:t>
-            </a:r>
-            <a:r>
-              <a:rPr lang="en-US" dirty="0" smtClean="0"/>
-              <a:t>Going On?</a:t>
+              <a:t>What is Going On?</a:t>
             </a:r>
             <a:endParaRPr lang="en-US" dirty="0"/>
           </a:p>
@@ -7621,11 +7496,7 @@
           <a:p>
             <a:r>
               <a:rPr lang="en-US" sz="1100" dirty="0" smtClean="0"/>
-              <a:t>Credit: This information </a:t>
-            </a:r>
-            <a:r>
-              <a:rPr lang="en-US" sz="1100" dirty="0" smtClean="0"/>
-              <a:t>on this slide was provided by David </a:t>
+              <a:t>Credit: This information on this slide was provided by David </a:t>
             </a:r>
             <a:r>
               <a:rPr lang="en-US" sz="1100" dirty="0" err="1" smtClean="0"/>
@@ -7643,7 +7514,6 @@
               <a:rPr lang="en-US" sz="1100" dirty="0"/>
               <a:t>Jorge Pereira </a:t>
             </a:r>
-            <a:endParaRPr lang="en-US" sz="1100" dirty="0"/>
           </a:p>
         </p:txBody>
       </p:sp>
@@ -7766,11 +7636,7 @@
           <a:p>
             <a:r>
               <a:rPr lang="en-US" dirty="0" smtClean="0"/>
-              <a:t>Thank you to Mr. Sam Last for first reporting this issue to us</a:t>
-            </a:r>
-            <a:r>
-              <a:rPr lang="en-US" dirty="0" smtClean="0"/>
-              <a:t>.</a:t>
+              <a:t>Thank you to Mr. Sam Last for first reporting this issue to us.</a:t>
             </a:r>
           </a:p>
           <a:p>
@@ -9094,11 +8960,19 @@
             </a:r>
             <a:r>
               <a:rPr lang="en-US" dirty="0" smtClean="0"/>
-              <a:t>15+ </a:t>
+              <a:t>30</a:t>
             </a:r>
             <a:r>
               <a:rPr lang="en-US" dirty="0" smtClean="0"/>
-              <a:t>gyro sensors  from various years </a:t>
+              <a:t>+ </a:t>
+            </a:r>
+            <a:r>
+              <a:rPr lang="en-US" dirty="0" smtClean="0"/>
+              <a:t>gyro sensors </a:t>
+            </a:r>
+            <a:r>
+              <a:rPr lang="en-US" dirty="0" smtClean="0"/>
+              <a:t>purchased in various years around the world </a:t>
             </a:r>
             <a:endParaRPr lang="en-US" dirty="0" smtClean="0"/>
           </a:p>
@@ -9204,15 +9078,7 @@
             <a:pPr lvl="1"/>
             <a:r>
               <a:rPr lang="en-US" dirty="0" smtClean="0"/>
-              <a:t>We thought the problem may be related to the </a:t>
-            </a:r>
-            <a:r>
-              <a:rPr lang="en-US" dirty="0" smtClean="0"/>
-              <a:t>code </a:t>
-            </a:r>
-            <a:r>
-              <a:rPr lang="en-US" dirty="0" smtClean="0"/>
-              <a:t>on the bottom of the gyro (shown in red circle) </a:t>
+              <a:t>We thought the problem may be related to the code on the bottom of the gyro (shown in red circle) </a:t>
             </a:r>
             <a:r>
               <a:rPr lang="mr-IN" dirty="0" smtClean="0"/>
@@ -9506,16 +9372,11 @@
               <a:rPr lang="en-US" dirty="0" smtClean="0"/>
               <a:t>Tests on the others were conducted by friends.</a:t>
             </a:r>
-            <a:endParaRPr lang="en-US" dirty="0" smtClean="0"/>
           </a:p>
           <a:p>
             <a:r>
               <a:rPr lang="en-US" sz="1700" i="1" dirty="0" smtClean="0"/>
-              <a:t>Note</a:t>
-            </a:r>
-            <a:r>
-              <a:rPr lang="en-US" sz="1700" i="1" dirty="0" smtClean="0"/>
-              <a:t>: If you complete this lesson and discover new numbers to add to the list, please email them to us at </a:t>
+              <a:t>Note: If you complete this lesson and discover new numbers to add to the list, please email them to us at </a:t>
             </a:r>
             <a:r>
               <a:rPr lang="en-US" sz="1700" i="1" dirty="0" smtClean="0">
@@ -9610,8 +9471,8 @@
         </p:nvSpPr>
         <p:spPr>
           <a:xfrm>
-            <a:off x="6333324" y="2016240"/>
-            <a:ext cx="1514857" cy="4401205"/>
+            <a:off x="5872129" y="1996342"/>
+            <a:ext cx="1514857" cy="4708981"/>
           </a:xfrm>
           <a:prstGeom prst="rect">
             <a:avLst/>
@@ -9625,7 +9486,7 @@
           <a:p>
             <a:pPr algn="ctr"/>
             <a:r>
-              <a:rPr lang="is-IS" sz="2000" dirty="0" smtClean="0">
+              <a:rPr lang="is-IS" sz="1200" dirty="0" smtClean="0">
                 <a:solidFill>
                   <a:srgbClr val="1D2129"/>
                 </a:solidFill>
@@ -9636,8 +9497,47 @@
           </a:p>
           <a:p>
             <a:pPr algn="ctr"/>
-            <a:r>
-              <a:rPr lang="is-IS" sz="2000" dirty="0" smtClean="0">
+            <a:endParaRPr lang="is-IS" sz="1200" dirty="0" smtClean="0">
+              <a:solidFill>
+                <a:srgbClr val="1D2129"/>
+              </a:solidFill>
+              <a:latin typeface="+mj-lt"/>
+            </a:endParaRPr>
+          </a:p>
+          <a:p>
+            <a:pPr algn="ctr"/>
+            <a:r>
+              <a:rPr lang="is-IS" sz="1200" dirty="0" smtClean="0">
+                <a:solidFill>
+                  <a:srgbClr val="1D2129"/>
+                </a:solidFill>
+                <a:latin typeface="+mj-lt"/>
+              </a:rPr>
+              <a:t>01N3</a:t>
+            </a:r>
+          </a:p>
+          <a:p>
+            <a:pPr algn="ctr"/>
+            <a:r>
+              <a:rPr lang="is-IS" sz="1200" dirty="0" smtClean="0">
+                <a:solidFill>
+                  <a:srgbClr val="1D2129"/>
+                </a:solidFill>
+                <a:latin typeface="+mj-lt"/>
+              </a:rPr>
+              <a:t>02N3</a:t>
+            </a:r>
+            <a:endParaRPr lang="is-IS" sz="1200" dirty="0" smtClean="0">
+              <a:solidFill>
+                <a:srgbClr val="1D2129"/>
+              </a:solidFill>
+              <a:latin typeface="+mj-lt"/>
+            </a:endParaRPr>
+          </a:p>
+          <a:p>
+            <a:pPr algn="ctr"/>
+            <a:r>
+              <a:rPr lang="is-IS" sz="1200" dirty="0" smtClean="0">
                 <a:solidFill>
                   <a:srgbClr val="1D2129"/>
                 </a:solidFill>
@@ -9646,7 +9546,7 @@
               <a:t>03N3</a:t>
             </a:r>
             <a:r>
-              <a:rPr lang="is-IS" sz="2000" dirty="0">
+              <a:rPr lang="is-IS" sz="1200" dirty="0">
                 <a:solidFill>
                   <a:srgbClr val="1D2129"/>
                 </a:solidFill>
@@ -9655,7 +9555,7 @@
               <a:t/>
             </a:r>
             <a:br>
-              <a:rPr lang="is-IS" sz="2000" dirty="0">
+              <a:rPr lang="is-IS" sz="1200" dirty="0">
                 <a:solidFill>
                   <a:srgbClr val="1D2129"/>
                 </a:solidFill>
@@ -9663,7 +9563,7 @@
               </a:rPr>
             </a:br>
             <a:r>
-              <a:rPr lang="is-IS" sz="2000" dirty="0">
+              <a:rPr lang="is-IS" sz="1200" dirty="0" smtClean="0">
                 <a:solidFill>
                   <a:srgbClr val="1D2129"/>
                 </a:solidFill>
@@ -9671,8 +9571,71 @@
               </a:rPr>
               <a:t>04N3</a:t>
             </a:r>
+          </a:p>
+          <a:p>
+            <a:pPr algn="ctr"/>
+            <a:r>
+              <a:rPr lang="is-IS" sz="1200" dirty="0" smtClean="0">
+                <a:solidFill>
+                  <a:srgbClr val="1D2129"/>
+                </a:solidFill>
+                <a:latin typeface="+mj-lt"/>
+              </a:rPr>
+              <a:t>05N3</a:t>
+            </a:r>
+          </a:p>
+          <a:p>
+            <a:pPr algn="ctr"/>
+            <a:r>
+              <a:rPr lang="is-IS" sz="1200" dirty="0" smtClean="0">
+                <a:solidFill>
+                  <a:srgbClr val="1D2129"/>
+                </a:solidFill>
+                <a:latin typeface="+mj-lt"/>
+              </a:rPr>
+              <a:t>06N3</a:t>
+            </a:r>
+          </a:p>
+          <a:p>
+            <a:pPr algn="ctr"/>
+            <a:r>
+              <a:rPr lang="is-IS" sz="1200" dirty="0" smtClean="0">
+                <a:solidFill>
+                  <a:srgbClr val="1D2129"/>
+                </a:solidFill>
+                <a:latin typeface="+mj-lt"/>
+              </a:rPr>
+              <a:t>16N3</a:t>
+            </a:r>
+            <a:endParaRPr lang="is-IS" sz="1200" dirty="0" smtClean="0">
+              <a:solidFill>
+                <a:srgbClr val="1D2129"/>
+              </a:solidFill>
+              <a:latin typeface="+mj-lt"/>
+            </a:endParaRPr>
+          </a:p>
+          <a:p>
+            <a:pPr algn="ctr"/>
+            <a:r>
+              <a:rPr lang="is-IS" sz="1200" dirty="0" smtClean="0">
+                <a:solidFill>
+                  <a:srgbClr val="1D2129"/>
+                </a:solidFill>
+                <a:latin typeface="+mj-lt"/>
+              </a:rPr>
+              <a:t>17N3</a:t>
+            </a:r>
+            <a:r>
+              <a:rPr lang="is-IS" sz="1200" dirty="0">
+                <a:solidFill>
+                  <a:srgbClr val="1D2129"/>
+                </a:solidFill>
+                <a:latin typeface="+mj-lt"/>
+              </a:rPr>
+              <a:t/>
+            </a:r>
             <a:br>
-              <a:rPr lang="is-IS" sz="2000" dirty="0">
+              <a:rPr lang="is-IS" sz="1200" dirty="0">
                 <a:solidFill>
                   <a:srgbClr val="1D2129"/>
                 </a:solidFill>
@@ -9680,7 +9643,7 @@
               </a:rPr>
             </a:br>
             <a:r>
-              <a:rPr lang="is-IS" sz="2000" dirty="0" smtClean="0">
+              <a:rPr lang="is-IS" sz="1200" dirty="0" smtClean="0">
                 <a:solidFill>
                   <a:srgbClr val="1D2129"/>
                 </a:solidFill>
@@ -9688,8 +9651,122 @@
               </a:rPr>
               <a:t>19N3</a:t>
             </a:r>
-            <a:r>
-              <a:rPr lang="is-IS" sz="2000" dirty="0">
+          </a:p>
+          <a:p>
+            <a:pPr algn="ctr"/>
+            <a:r>
+              <a:rPr lang="is-IS" sz="1200" dirty="0" smtClean="0">
+                <a:solidFill>
+                  <a:srgbClr val="1D2129"/>
+                </a:solidFill>
+                <a:latin typeface="+mj-lt"/>
+              </a:rPr>
+              <a:t>43N3</a:t>
+            </a:r>
+            <a:endParaRPr lang="is-IS" sz="1200" dirty="0" smtClean="0">
+              <a:solidFill>
+                <a:srgbClr val="1D2129"/>
+              </a:solidFill>
+              <a:latin typeface="+mj-lt"/>
+            </a:endParaRPr>
+          </a:p>
+          <a:p>
+            <a:pPr algn="ctr"/>
+            <a:r>
+              <a:rPr lang="is-IS" sz="1200" dirty="0" smtClean="0">
+                <a:solidFill>
+                  <a:srgbClr val="1D2129"/>
+                </a:solidFill>
+                <a:latin typeface="+mj-lt"/>
+              </a:rPr>
+              <a:t>44N3</a:t>
+            </a:r>
+            <a:endParaRPr lang="is-IS" sz="1200" dirty="0" smtClean="0">
+              <a:solidFill>
+                <a:srgbClr val="1D2129"/>
+              </a:solidFill>
+              <a:latin typeface="+mj-lt"/>
+            </a:endParaRPr>
+          </a:p>
+          <a:p>
+            <a:pPr algn="ctr"/>
+            <a:r>
+              <a:rPr lang="is-IS" sz="1200" dirty="0" smtClean="0">
+                <a:solidFill>
+                  <a:srgbClr val="1D2129"/>
+                </a:solidFill>
+                <a:latin typeface="+mj-lt"/>
+              </a:rPr>
+              <a:t>45N3</a:t>
+            </a:r>
+            <a:endParaRPr lang="is-IS" sz="1200" dirty="0" smtClean="0">
+              <a:solidFill>
+                <a:srgbClr val="1D2129"/>
+              </a:solidFill>
+              <a:latin typeface="+mj-lt"/>
+            </a:endParaRPr>
+          </a:p>
+          <a:p>
+            <a:pPr algn="ctr"/>
+            <a:r>
+              <a:rPr lang="is-IS" sz="1200" dirty="0" smtClean="0">
+                <a:solidFill>
+                  <a:srgbClr val="1D2129"/>
+                </a:solidFill>
+                <a:latin typeface="+mj-lt"/>
+              </a:rPr>
+              <a:t>47N3</a:t>
+            </a:r>
+          </a:p>
+          <a:p>
+            <a:pPr algn="ctr"/>
+            <a:r>
+              <a:rPr lang="is-IS" sz="1200" dirty="0" smtClean="0">
+                <a:solidFill>
+                  <a:srgbClr val="1D2129"/>
+                </a:solidFill>
+                <a:latin typeface="+mj-lt"/>
+              </a:rPr>
+              <a:t>49N3</a:t>
+            </a:r>
+            <a:endParaRPr lang="is-IS" sz="1200" dirty="0" smtClean="0">
+              <a:solidFill>
+                <a:srgbClr val="1D2129"/>
+              </a:solidFill>
+              <a:latin typeface="+mj-lt"/>
+            </a:endParaRPr>
+          </a:p>
+          <a:p>
+            <a:pPr algn="ctr"/>
+            <a:r>
+              <a:rPr lang="en-US" sz="1200" dirty="0" smtClean="0"/>
+              <a:t>51N3</a:t>
+            </a:r>
+          </a:p>
+          <a:p>
+            <a:pPr algn="ctr"/>
+            <a:endParaRPr lang="is-IS" sz="1200" dirty="0" smtClean="0"/>
+          </a:p>
+          <a:p>
+            <a:pPr algn="ctr"/>
+            <a:r>
+              <a:rPr lang="is-IS" sz="1200" dirty="0" smtClean="0"/>
+              <a:t>09N4</a:t>
+            </a:r>
+          </a:p>
+          <a:p>
+            <a:pPr algn="ctr"/>
+            <a:r>
+              <a:rPr lang="is-IS" sz="1200" dirty="0" smtClean="0">
+                <a:solidFill>
+                  <a:srgbClr val="1D2129"/>
+                </a:solidFill>
+                <a:latin typeface="+mj-lt"/>
+              </a:rPr>
+              <a:t>15N4</a:t>
+            </a:r>
+            <a:r>
+              <a:rPr lang="is-IS" sz="1200" dirty="0">
                 <a:solidFill>
                   <a:srgbClr val="1D2129"/>
                 </a:solidFill>
@@ -9698,7 +9775,7 @@
               <a:t/>
             </a:r>
             <a:br>
-              <a:rPr lang="is-IS" sz="2000" dirty="0">
+              <a:rPr lang="is-IS" sz="1200" dirty="0">
                 <a:solidFill>
                   <a:srgbClr val="1D2129"/>
                 </a:solidFill>
@@ -9706,7 +9783,7 @@
               </a:rPr>
             </a:br>
             <a:r>
-              <a:rPr lang="is-IS" sz="2000" dirty="0">
+              <a:rPr lang="is-IS" sz="1200" dirty="0">
                 <a:solidFill>
                   <a:srgbClr val="1D2129"/>
                 </a:solidFill>
@@ -9715,7 +9792,7 @@
               <a:t>20N4</a:t>
             </a:r>
             <a:br>
-              <a:rPr lang="is-IS" sz="2000" dirty="0">
+              <a:rPr lang="is-IS" sz="1200" dirty="0">
                 <a:solidFill>
                   <a:srgbClr val="1D2129"/>
                 </a:solidFill>
@@ -9723,7 +9800,7 @@
               </a:rPr>
             </a:br>
             <a:r>
-              <a:rPr lang="is-IS" sz="2000" dirty="0">
+              <a:rPr lang="is-IS" sz="1200" dirty="0">
                 <a:solidFill>
                   <a:srgbClr val="1D2129"/>
                 </a:solidFill>
@@ -9732,7 +9809,7 @@
               <a:t>21N4</a:t>
             </a:r>
             <a:br>
-              <a:rPr lang="is-IS" sz="2000" dirty="0">
+              <a:rPr lang="is-IS" sz="1200" dirty="0">
                 <a:solidFill>
                   <a:srgbClr val="1D2129"/>
                 </a:solidFill>
@@ -9740,7 +9817,7 @@
               </a:rPr>
             </a:br>
             <a:r>
-              <a:rPr lang="is-IS" sz="2000" dirty="0" smtClean="0">
+              <a:rPr lang="is-IS" sz="1200" dirty="0" smtClean="0">
                 <a:solidFill>
                   <a:srgbClr val="1D2129"/>
                 </a:solidFill>
@@ -9752,130 +9829,30 @@
           <a:p>
             <a:pPr algn="ctr"/>
             <a:r>
-              <a:rPr lang="is-IS" sz="2000" dirty="0" smtClean="0">
+              <a:rPr lang="is-IS" sz="1200" dirty="0" smtClean="0">
                 <a:solidFill>
                   <a:srgbClr val="1D2129"/>
                 </a:solidFill>
                 <a:latin typeface="+mj-lt"/>
               </a:rPr>
-              <a:t>17N5</a:t>
-            </a:r>
-            <a:r>
-              <a:rPr lang="is-IS" sz="2000" dirty="0">
+              <a:t>39N4</a:t>
+            </a:r>
+          </a:p>
+          <a:p>
+            <a:pPr algn="ctr"/>
+            <a:r>
+              <a:rPr lang="is-IS" sz="1200" dirty="0" smtClean="0">
                 <a:solidFill>
                   <a:srgbClr val="1D2129"/>
                 </a:solidFill>
                 <a:latin typeface="+mj-lt"/>
               </a:rPr>
-              <a:t/>
-            </a:r>
-            <a:br>
-              <a:rPr lang="is-IS" sz="2000" dirty="0">
-                <a:solidFill>
-                  <a:srgbClr val="1D2129"/>
-                </a:solidFill>
-                <a:latin typeface="+mj-lt"/>
-              </a:rPr>
-            </a:br>
-            <a:r>
-              <a:rPr lang="is-IS" sz="2000" dirty="0" smtClean="0">
-                <a:solidFill>
-                  <a:srgbClr val="1D2129"/>
-                </a:solidFill>
-                <a:latin typeface="+mj-lt"/>
-              </a:rPr>
-              <a:t>22N5</a:t>
-            </a:r>
-          </a:p>
-          <a:p>
-            <a:pPr algn="ctr"/>
-            <a:r>
-              <a:rPr lang="is-IS" sz="2000" dirty="0" smtClean="0">
-                <a:solidFill>
-                  <a:srgbClr val="1D2129"/>
-                </a:solidFill>
-                <a:latin typeface="+mj-lt"/>
-              </a:rPr>
-              <a:t>27N5</a:t>
-            </a:r>
-            <a:r>
-              <a:rPr lang="is-IS" sz="2000" dirty="0">
-                <a:solidFill>
-                  <a:srgbClr val="1D2129"/>
-                </a:solidFill>
-                <a:latin typeface="+mj-lt"/>
-              </a:rPr>
-              <a:t/>
-            </a:r>
-            <a:br>
-              <a:rPr lang="is-IS" sz="2000" dirty="0">
-                <a:solidFill>
-                  <a:srgbClr val="1D2129"/>
-                </a:solidFill>
-                <a:latin typeface="+mj-lt"/>
-              </a:rPr>
-            </a:br>
-            <a:r>
-              <a:rPr lang="is-IS" sz="2000" dirty="0">
-                <a:solidFill>
-                  <a:srgbClr val="1D2129"/>
-                </a:solidFill>
-                <a:latin typeface="+mj-lt"/>
-              </a:rPr>
-              <a:t>28N5</a:t>
-            </a:r>
-            <a:br>
-              <a:rPr lang="is-IS" sz="2000" dirty="0">
-                <a:solidFill>
-                  <a:srgbClr val="1D2129"/>
-                </a:solidFill>
-                <a:latin typeface="+mj-lt"/>
-              </a:rPr>
-            </a:br>
-            <a:r>
-              <a:rPr lang="is-IS" sz="2000" dirty="0">
-                <a:solidFill>
-                  <a:srgbClr val="1D2129"/>
-                </a:solidFill>
-                <a:latin typeface="+mj-lt"/>
-              </a:rPr>
-              <a:t>36N5</a:t>
-            </a:r>
-            <a:br>
-              <a:rPr lang="is-IS" sz="2000" dirty="0">
-                <a:solidFill>
-                  <a:srgbClr val="1D2129"/>
-                </a:solidFill>
-                <a:latin typeface="+mj-lt"/>
-              </a:rPr>
-            </a:br>
-            <a:r>
-              <a:rPr lang="is-IS" sz="2000" dirty="0" smtClean="0">
-                <a:solidFill>
-                  <a:srgbClr val="1D2129"/>
-                </a:solidFill>
-                <a:latin typeface="+mj-lt"/>
-              </a:rPr>
-              <a:t>45N5</a:t>
-            </a:r>
-            <a:r>
-              <a:rPr lang="is-IS" sz="2000" dirty="0">
-                <a:solidFill>
-                  <a:srgbClr val="1D2129"/>
-                </a:solidFill>
-                <a:latin typeface="+mj-lt"/>
-              </a:rPr>
-              <a:t/>
-            </a:r>
-            <a:br>
-              <a:rPr lang="is-IS" sz="2000" dirty="0">
-                <a:solidFill>
-                  <a:srgbClr val="1D2129"/>
-                </a:solidFill>
-                <a:latin typeface="+mj-lt"/>
-              </a:rPr>
-            </a:br>
-            <a:endParaRPr lang="en-US" sz="2000" dirty="0">
+              <a:t>50N4</a:t>
+            </a:r>
+            <a:endParaRPr lang="is-IS" sz="1200" dirty="0" smtClean="0">
+              <a:solidFill>
+                <a:srgbClr val="1D2129"/>
+              </a:solidFill>
               <a:latin typeface="+mj-lt"/>
             </a:endParaRPr>
           </a:p>
@@ -9920,8 +9897,8 @@
         </p:nvSpPr>
         <p:spPr>
           <a:xfrm>
-            <a:off x="7305656" y="2016240"/>
-            <a:ext cx="1085049" cy="1323439"/>
+            <a:off x="7386986" y="1996342"/>
+            <a:ext cx="1085049" cy="3046988"/>
           </a:xfrm>
           <a:prstGeom prst="rect">
             <a:avLst/>
@@ -9935,7 +9912,139 @@
           <a:p>
             <a:pPr algn="ctr"/>
             <a:r>
-              <a:rPr lang="is-IS" sz="2000" dirty="0" smtClean="0">
+              <a:rPr lang="is-IS" sz="1200" dirty="0">
+                <a:solidFill>
+                  <a:srgbClr val="1D2129"/>
+                </a:solidFill>
+              </a:rPr>
+              <a:t>13N5</a:t>
+            </a:r>
+          </a:p>
+          <a:p>
+            <a:pPr algn="ctr"/>
+            <a:r>
+              <a:rPr lang="is-IS" sz="1200" dirty="0" smtClean="0">
+                <a:solidFill>
+                  <a:srgbClr val="1D2129"/>
+                </a:solidFill>
+              </a:rPr>
+              <a:t>17N5</a:t>
+            </a:r>
+          </a:p>
+          <a:p>
+            <a:pPr algn="ctr"/>
+            <a:r>
+              <a:rPr lang="is-IS" sz="1200" dirty="0" smtClean="0">
+                <a:solidFill>
+                  <a:srgbClr val="1D2129"/>
+                </a:solidFill>
+              </a:rPr>
+              <a:t>21N5</a:t>
+            </a:r>
+            <a:r>
+              <a:rPr lang="is-IS" sz="1200" dirty="0">
+                <a:solidFill>
+                  <a:srgbClr val="1D2129"/>
+                </a:solidFill>
+              </a:rPr>
+              <a:t/>
+            </a:r>
+            <a:br>
+              <a:rPr lang="is-IS" sz="1200" dirty="0">
+                <a:solidFill>
+                  <a:srgbClr val="1D2129"/>
+                </a:solidFill>
+              </a:rPr>
+            </a:br>
+            <a:r>
+              <a:rPr lang="is-IS" sz="1200" dirty="0">
+                <a:solidFill>
+                  <a:srgbClr val="1D2129"/>
+                </a:solidFill>
+              </a:rPr>
+              <a:t>22N5</a:t>
+            </a:r>
+          </a:p>
+          <a:p>
+            <a:pPr algn="ctr"/>
+            <a:r>
+              <a:rPr lang="is-IS" sz="1200" dirty="0">
+                <a:solidFill>
+                  <a:srgbClr val="1D2129"/>
+                </a:solidFill>
+              </a:rPr>
+              <a:t>27N5</a:t>
+            </a:r>
+            <a:br>
+              <a:rPr lang="is-IS" sz="1200" dirty="0">
+                <a:solidFill>
+                  <a:srgbClr val="1D2129"/>
+                </a:solidFill>
+              </a:rPr>
+            </a:br>
+            <a:r>
+              <a:rPr lang="is-IS" sz="1200" dirty="0">
+                <a:solidFill>
+                  <a:srgbClr val="1D2129"/>
+                </a:solidFill>
+              </a:rPr>
+              <a:t>28N5</a:t>
+            </a:r>
+            <a:br>
+              <a:rPr lang="is-IS" sz="1200" dirty="0">
+                <a:solidFill>
+                  <a:srgbClr val="1D2129"/>
+                </a:solidFill>
+              </a:rPr>
+            </a:br>
+            <a:r>
+              <a:rPr lang="is-IS" sz="1200" dirty="0">
+                <a:solidFill>
+                  <a:srgbClr val="1D2129"/>
+                </a:solidFill>
+              </a:rPr>
+              <a:t>36N5</a:t>
+            </a:r>
+            <a:br>
+              <a:rPr lang="is-IS" sz="1200" dirty="0">
+                <a:solidFill>
+                  <a:srgbClr val="1D2129"/>
+                </a:solidFill>
+              </a:rPr>
+            </a:br>
+            <a:r>
+              <a:rPr lang="is-IS" sz="1200" dirty="0">
+                <a:solidFill>
+                  <a:srgbClr val="1D2129"/>
+                </a:solidFill>
+              </a:rPr>
+              <a:t>45N5</a:t>
+            </a:r>
+            <a:br>
+              <a:rPr lang="is-IS" sz="1200" dirty="0">
+                <a:solidFill>
+                  <a:srgbClr val="1D2129"/>
+                </a:solidFill>
+              </a:rPr>
+            </a:br>
+            <a:endParaRPr lang="en-US" sz="1200" dirty="0"/>
+          </a:p>
+          <a:p>
+            <a:pPr algn="ctr"/>
+            <a:r>
+              <a:rPr lang="is-IS" sz="1200" dirty="0" smtClean="0">
+                <a:solidFill>
+                  <a:srgbClr val="1D2129"/>
+                </a:solidFill>
+                <a:latin typeface="+mj-lt"/>
+              </a:rPr>
+              <a:t>03N6</a:t>
+            </a:r>
+          </a:p>
+          <a:p>
+            <a:pPr algn="ctr"/>
+            <a:r>
+              <a:rPr lang="is-IS" sz="1200" dirty="0" smtClean="0">
                 <a:solidFill>
                   <a:srgbClr val="1D2129"/>
                 </a:solidFill>
@@ -9944,7 +10053,7 @@
               <a:t>05N6</a:t>
             </a:r>
             <a:r>
-              <a:rPr lang="is-IS" sz="2000" dirty="0">
+              <a:rPr lang="is-IS" sz="1200" dirty="0">
                 <a:solidFill>
                   <a:srgbClr val="1D2129"/>
                 </a:solidFill>
@@ -9953,7 +10062,7 @@
               <a:t/>
             </a:r>
             <a:br>
-              <a:rPr lang="is-IS" sz="2000" dirty="0">
+              <a:rPr lang="is-IS" sz="1200" dirty="0">
                 <a:solidFill>
                   <a:srgbClr val="1D2129"/>
                 </a:solidFill>
@@ -9961,7 +10070,7 @@
               </a:rPr>
             </a:br>
             <a:r>
-              <a:rPr lang="is-IS" sz="2000" dirty="0">
+              <a:rPr lang="is-IS" sz="1200" dirty="0" smtClean="0">
                 <a:solidFill>
                   <a:srgbClr val="1D2129"/>
                 </a:solidFill>
@@ -9969,8 +10078,47 @@
               </a:rPr>
               <a:t>06N6</a:t>
             </a:r>
+          </a:p>
+          <a:p>
+            <a:pPr algn="ctr"/>
+            <a:r>
+              <a:rPr lang="is-IS" sz="1200" dirty="0" smtClean="0">
+                <a:solidFill>
+                  <a:srgbClr val="1D2129"/>
+                </a:solidFill>
+                <a:latin typeface="+mj-lt"/>
+              </a:rPr>
+              <a:t>15N6</a:t>
+            </a:r>
+            <a:endParaRPr lang="is-IS" sz="1200" dirty="0" smtClean="0">
+              <a:solidFill>
+                <a:srgbClr val="1D2129"/>
+              </a:solidFill>
+              <a:latin typeface="+mj-lt"/>
+            </a:endParaRPr>
+          </a:p>
+          <a:p>
+            <a:pPr algn="ctr"/>
+            <a:r>
+              <a:rPr lang="is-IS" sz="1200" dirty="0" smtClean="0">
+                <a:solidFill>
+                  <a:srgbClr val="1D2129"/>
+                </a:solidFill>
+                <a:latin typeface="+mj-lt"/>
+              </a:rPr>
+              <a:t>17N6</a:t>
+            </a:r>
+            <a:r>
+              <a:rPr lang="is-IS" sz="1200" dirty="0">
+                <a:solidFill>
+                  <a:srgbClr val="1D2129"/>
+                </a:solidFill>
+                <a:latin typeface="+mj-lt"/>
+              </a:rPr>
+              <a:t/>
+            </a:r>
             <a:br>
-              <a:rPr lang="is-IS" sz="2000" dirty="0">
+              <a:rPr lang="is-IS" sz="1200" dirty="0">
                 <a:solidFill>
                   <a:srgbClr val="1D2129"/>
                 </a:solidFill>
@@ -9978,7 +10126,7 @@
               </a:rPr>
             </a:br>
             <a:r>
-              <a:rPr lang="is-IS" sz="2000" dirty="0" smtClean="0">
+              <a:rPr lang="is-IS" sz="1200" dirty="0" smtClean="0">
                 <a:solidFill>
                   <a:srgbClr val="1D2129"/>
                 </a:solidFill>
@@ -9990,7 +10138,7 @@
           <a:p>
             <a:pPr algn="ctr"/>
             <a:r>
-              <a:rPr lang="is-IS" sz="2000" dirty="0" smtClean="0">
+              <a:rPr lang="is-IS" sz="1200" dirty="0" smtClean="0">
                 <a:solidFill>
                   <a:srgbClr val="1D2129"/>
                 </a:solidFill>
@@ -9998,9 +10146,39 @@
               </a:rPr>
               <a:t>23N6</a:t>
             </a:r>
-            <a:endParaRPr lang="en-US" sz="2000" dirty="0">
+            <a:endParaRPr lang="en-US" sz="1200" dirty="0">
               <a:latin typeface="+mj-lt"/>
             </a:endParaRPr>
+          </a:p>
+        </p:txBody>
+      </p:sp>
+      <p:sp>
+        <p:nvSpPr>
+          <p:cNvPr id="7" name="TextBox 6"/>
+          <p:cNvSpPr txBox="1"/>
+          <p:nvPr/>
+        </p:nvSpPr>
+        <p:spPr>
+          <a:xfrm>
+            <a:off x="7535917" y="5504994"/>
+            <a:ext cx="1261242" cy="738664"/>
+          </a:xfrm>
+          <a:prstGeom prst="rect">
+            <a:avLst/>
+          </a:prstGeom>
+          <a:noFill/>
+        </p:spPr>
+        <p:txBody>
+          <a:bodyPr wrap="square" rtlCol="0">
+            <a:spAutoFit/>
+          </a:bodyPr>
+          <a:lstStyle/>
+          <a:p>
+            <a:r>
+              <a:rPr lang="en-US" sz="1400" i="1" dirty="0" smtClean="0"/>
+              <a:t>These are codes shared with us</a:t>
+            </a:r>
+            <a:endParaRPr lang="en-US" sz="1400" i="1" dirty="0"/>
           </a:p>
         </p:txBody>
       </p:sp>
@@ -10092,30 +10270,14 @@
             </a:r>
             <a:r>
               <a:rPr lang="en-US" dirty="0" smtClean="0"/>
-              <a:t>You can look for the tiny </a:t>
-            </a:r>
-            <a:r>
-              <a:rPr lang="en-US" dirty="0" smtClean="0"/>
-              <a:t>code </a:t>
-            </a:r>
-            <a:r>
-              <a:rPr lang="en-US" dirty="0" smtClean="0"/>
-              <a:t>printed on the gyro sensors and look at the last </a:t>
-            </a:r>
-            <a:r>
-              <a:rPr lang="en-US" dirty="0" smtClean="0"/>
-              <a:t>two Letter-Digit combination</a:t>
+              <a:t>You can look for the tiny code printed on the gyro sensors and look at the last two Letter-Digit combination</a:t>
             </a:r>
             <a:endParaRPr lang="en-US" dirty="0"/>
           </a:p>
           <a:p>
             <a:r>
               <a:rPr lang="en-US" u="sng" dirty="0" smtClean="0"/>
-              <a:t>Method </a:t>
-            </a:r>
-            <a:r>
-              <a:rPr lang="en-US" u="sng" dirty="0" smtClean="0"/>
-              <a:t>2: </a:t>
+              <a:t>Method 2: </a:t>
             </a:r>
             <a:r>
               <a:rPr lang="en-US" dirty="0" smtClean="0"/>
@@ -10600,11 +10762,7 @@
           <a:p>
             <a:r>
               <a:rPr lang="en-US" dirty="0" smtClean="0"/>
-              <a:t>Close up View of the </a:t>
-            </a:r>
-            <a:r>
-              <a:rPr lang="en-US" dirty="0" smtClean="0"/>
-              <a:t>Sample Codes</a:t>
+              <a:t>Close up View of the Sample Codes</a:t>
             </a:r>
             <a:endParaRPr lang="en-US" dirty="0"/>
           </a:p>
@@ -10854,15 +11012,7 @@
                   <a:srgbClr val="FF0000"/>
                 </a:solidFill>
               </a:rPr>
-              <a:t>Wherever this presentation mentions </a:t>
-            </a:r>
-            <a:r>
-              <a:rPr lang="en-US" sz="2000" i="1" dirty="0" smtClean="0">
-                <a:solidFill>
-                  <a:srgbClr val="FF0000"/>
-                </a:solidFill>
-              </a:rPr>
-              <a:t>N4, the result has been confirmed for N5</a:t>
+              <a:t>Wherever this presentation mentions N4, the result has been confirmed for N5</a:t>
             </a:r>
             <a:r>
               <a:rPr lang="en-US" sz="2000" i="1" dirty="0">
@@ -10878,15 +11028,7 @@
                   <a:srgbClr val="FF0000"/>
                 </a:solidFill>
               </a:rPr>
-              <a:t>and </a:t>
-            </a:r>
-            <a:r>
-              <a:rPr lang="en-US" sz="2000" i="1" dirty="0" smtClean="0">
-                <a:solidFill>
-                  <a:srgbClr val="FF0000"/>
-                </a:solidFill>
-              </a:rPr>
-              <a:t>N6 as well.</a:t>
+              <a:t>and N6 as well.</a:t>
             </a:r>
           </a:p>
           <a:p>
@@ -10966,15 +11108,7 @@
           <a:p>
             <a:r>
               <a:rPr lang="en-US" dirty="0" smtClean="0"/>
-              <a:t>What if </a:t>
-            </a:r>
-            <a:r>
-              <a:rPr lang="en-US" dirty="0" smtClean="0"/>
-              <a:t>Don’t Own an N2/N3 Sensor</a:t>
-            </a:r>
-            <a:r>
-              <a:rPr lang="en-US" dirty="0" smtClean="0"/>
-              <a:t>?</a:t>
+              <a:t>What if Don’t Own an N2/N3 Sensor?</a:t>
             </a:r>
             <a:r>
               <a:rPr lang="en-US" baseline="30000" dirty="0" smtClean="0"/>
@@ -11129,15 +11263,7 @@
           <a:p>
             <a:r>
               <a:rPr lang="en-US" dirty="0" smtClean="0"/>
-              <a:t>See the next 4 slides for updated recalibration code for the “N4” and up sensors. (Can be used with “N3</a:t>
-            </a:r>
-            <a:r>
-              <a:rPr lang="en-US" dirty="0" smtClean="0"/>
-              <a:t>” and below </a:t>
-            </a:r>
-            <a:r>
-              <a:rPr lang="en-US" dirty="0" smtClean="0"/>
-              <a:t>as well.)</a:t>
+              <a:t>See the next 4 slides for updated recalibration code for the “N4” and up sensors. (Can be used with “N3” and below as well.)</a:t>
             </a:r>
           </a:p>
           <a:p>

</xml_diff>